<commit_message>
Prezentace - průběžná aktualizace
</commit_message>
<xml_diff>
--- a/Presentation/00 - Intro.pptx
+++ b/Presentation/00 - Intro.pptx
@@ -5,12 +5,13 @@
     <p:sldMasterId id="2147483794" r:id="rId4"/>
   </p:sldMasterIdLst>
   <p:notesMasterIdLst>
-    <p:notesMasterId r:id="rId8"/>
+    <p:notesMasterId r:id="rId9"/>
   </p:notesMasterIdLst>
   <p:sldIdLst>
     <p:sldId id="256" r:id="rId5"/>
     <p:sldId id="322" r:id="rId6"/>
     <p:sldId id="320" r:id="rId7"/>
+    <p:sldId id="323" r:id="rId8"/>
   </p:sldIdLst>
   <p:sldSz cx="12192000" cy="6858000"/>
   <p:notesSz cx="6858000" cy="9144000"/>
@@ -241,7 +242,7 @@
             <a:fld id="{A74C3DD1-6B4C-423E-A696-BD4124EC33BC}" type="datetimeFigureOut">
               <a:rPr lang="cs-CZ" smtClean="0"/>
               <a:pPr/>
-              <a:t>14.02.2024</a:t>
+              <a:t>19.02.2024</a:t>
             </a:fld>
             <a:endParaRPr lang="cs-CZ" dirty="0"/>
           </a:p>
@@ -708,7 +709,7 @@
           <a:p>
             <a:fld id="{0DA6F2F8-F70A-47D7-AD2D-4F12E71A0C18}" type="datetimeFigureOut">
               <a:rPr lang="cs-CZ" smtClean="0"/>
-              <a:t>14.02.2024</a:t>
+              <a:t>19.02.2024</a:t>
             </a:fld>
             <a:endParaRPr lang="cs-CZ"/>
           </a:p>
@@ -890,7 +891,7 @@
           <a:p>
             <a:fld id="{0DA6F2F8-F70A-47D7-AD2D-4F12E71A0C18}" type="datetimeFigureOut">
               <a:rPr lang="cs-CZ" smtClean="0"/>
-              <a:t>14.02.2024</a:t>
+              <a:t>19.02.2024</a:t>
             </a:fld>
             <a:endParaRPr lang="cs-CZ"/>
           </a:p>
@@ -1082,7 +1083,7 @@
           <a:p>
             <a:fld id="{0DA6F2F8-F70A-47D7-AD2D-4F12E71A0C18}" type="datetimeFigureOut">
               <a:rPr lang="cs-CZ" smtClean="0"/>
-              <a:t>14.02.2024</a:t>
+              <a:t>19.02.2024</a:t>
             </a:fld>
             <a:endParaRPr lang="cs-CZ"/>
           </a:p>
@@ -1297,7 +1298,7 @@
           <a:p>
             <a:fld id="{0DA6F2F8-F70A-47D7-AD2D-4F12E71A0C18}" type="datetimeFigureOut">
               <a:rPr lang="cs-CZ" smtClean="0"/>
-              <a:t>14.02.2024</a:t>
+              <a:t>19.02.2024</a:t>
             </a:fld>
             <a:endParaRPr lang="cs-CZ"/>
           </a:p>
@@ -1572,7 +1573,7 @@
           <a:p>
             <a:fld id="{0DA6F2F8-F70A-47D7-AD2D-4F12E71A0C18}" type="datetimeFigureOut">
               <a:rPr lang="cs-CZ" smtClean="0"/>
-              <a:t>14.02.2024</a:t>
+              <a:t>19.02.2024</a:t>
             </a:fld>
             <a:endParaRPr lang="cs-CZ"/>
           </a:p>
@@ -1889,7 +1890,7 @@
           <a:p>
             <a:fld id="{0DA6F2F8-F70A-47D7-AD2D-4F12E71A0C18}" type="datetimeFigureOut">
               <a:rPr lang="cs-CZ" smtClean="0"/>
-              <a:t>14.02.2024</a:t>
+              <a:t>19.02.2024</a:t>
             </a:fld>
             <a:endParaRPr lang="cs-CZ" dirty="0"/>
           </a:p>
@@ -2340,7 +2341,7 @@
           <a:p>
             <a:fld id="{0DA6F2F8-F70A-47D7-AD2D-4F12E71A0C18}" type="datetimeFigureOut">
               <a:rPr lang="cs-CZ" smtClean="0"/>
-              <a:t>14.02.2024</a:t>
+              <a:t>19.02.2024</a:t>
             </a:fld>
             <a:endParaRPr lang="cs-CZ"/>
           </a:p>
@@ -2487,7 +2488,7 @@
           <a:p>
             <a:fld id="{0DA6F2F8-F70A-47D7-AD2D-4F12E71A0C18}" type="datetimeFigureOut">
               <a:rPr lang="cs-CZ" smtClean="0"/>
-              <a:t>14.02.2024</a:t>
+              <a:t>19.02.2024</a:t>
             </a:fld>
             <a:endParaRPr lang="cs-CZ"/>
           </a:p>
@@ -2594,7 +2595,7 @@
           <a:p>
             <a:fld id="{0DA6F2F8-F70A-47D7-AD2D-4F12E71A0C18}" type="datetimeFigureOut">
               <a:rPr lang="cs-CZ" smtClean="0"/>
-              <a:t>14.02.2024</a:t>
+              <a:t>19.02.2024</a:t>
             </a:fld>
             <a:endParaRPr lang="cs-CZ"/>
           </a:p>
@@ -2885,7 +2886,7 @@
           <a:p>
             <a:fld id="{0DA6F2F8-F70A-47D7-AD2D-4F12E71A0C18}" type="datetimeFigureOut">
               <a:rPr lang="cs-CZ" smtClean="0"/>
-              <a:t>14.02.2024</a:t>
+              <a:t>19.02.2024</a:t>
             </a:fld>
             <a:endParaRPr lang="cs-CZ"/>
           </a:p>
@@ -3154,7 +3155,7 @@
           <a:p>
             <a:fld id="{0DA6F2F8-F70A-47D7-AD2D-4F12E71A0C18}" type="datetimeFigureOut">
               <a:rPr lang="cs-CZ" smtClean="0"/>
-              <a:t>14.02.2024</a:t>
+              <a:t>19.02.2024</a:t>
             </a:fld>
             <a:endParaRPr lang="cs-CZ"/>
           </a:p>
@@ -3418,7 +3419,7 @@
           <a:p>
             <a:fld id="{0DA6F2F8-F70A-47D7-AD2D-4F12E71A0C18}" type="datetimeFigureOut">
               <a:rPr lang="cs-CZ" smtClean="0"/>
-              <a:t>14.02.2024</a:t>
+              <a:t>19.02.2024</a:t>
             </a:fld>
             <a:endParaRPr lang="cs-CZ"/>
           </a:p>
@@ -4043,15 +4044,17 @@
           </a:p>
           <a:p>
             <a:r>
-              <a:rPr lang="cs-CZ" dirty="0"/>
-              <a:t>Layout</a:t>
-            </a:r>
-          </a:p>
-          <a:p>
-            <a:r>
-              <a:rPr lang="cs-CZ" dirty="0"/>
+              <a:rPr lang="cs-CZ" dirty="0" err="1"/>
               <a:t>Routing</a:t>
             </a:r>
+            <a:endParaRPr lang="cs-CZ" dirty="0"/>
+          </a:p>
+          <a:p>
+            <a:r>
+              <a:rPr lang="cs-CZ" dirty="0" err="1"/>
+              <a:t>Lifecycle</a:t>
+            </a:r>
+            <a:endParaRPr lang="cs-CZ" dirty="0"/>
           </a:p>
           <a:p>
             <a:r>
@@ -4473,6 +4476,181 @@
     <p:extLst>
       <p:ext uri="{BB962C8B-B14F-4D97-AF65-F5344CB8AC3E}">
         <p14:creationId xmlns:p14="http://schemas.microsoft.com/office/powerpoint/2010/main" val="2196838892"/>
+      </p:ext>
+    </p:extLst>
+  </p:cSld>
+  <p:clrMapOvr>
+    <a:masterClrMapping/>
+  </p:clrMapOvr>
+  <mc:AlternateContent xmlns:mc="http://schemas.openxmlformats.org/markup-compatibility/2006" xmlns:p14="http://schemas.microsoft.com/office/powerpoint/2010/main">
+    <mc:Choice Requires="p14">
+      <p:transition p14:dur="0"/>
+    </mc:Choice>
+    <mc:Fallback xmlns="">
+      <p:transition/>
+    </mc:Fallback>
+  </mc:AlternateContent>
+</p:sld>
+</file>
+
+<file path=ppt/slides/slide4.xml><?xml version="1.0" encoding="utf-8"?>
+<p:sld xmlns:a="http://schemas.openxmlformats.org/drawingml/2006/main" xmlns:r="http://schemas.openxmlformats.org/officeDocument/2006/relationships" xmlns:p="http://schemas.openxmlformats.org/presentationml/2006/main" showMasterSp="0">
+  <p:cSld>
+    <p:spTree>
+      <p:nvGrpSpPr>
+        <p:cNvPr id="1" name="">
+          <a:extLst>
+            <a:ext uri="{FF2B5EF4-FFF2-40B4-BE49-F238E27FC236}">
+              <a16:creationId xmlns:a16="http://schemas.microsoft.com/office/drawing/2014/main" id="{AB1B9B0F-FED4-CAA9-C332-AF549349813B}"/>
+            </a:ext>
+          </a:extLst>
+        </p:cNvPr>
+        <p:cNvGrpSpPr/>
+        <p:nvPr/>
+      </p:nvGrpSpPr>
+      <p:grpSpPr>
+        <a:xfrm>
+          <a:off x="0" y="0"/>
+          <a:ext cx="0" cy="0"/>
+          <a:chOff x="0" y="0"/>
+          <a:chExt cx="0" cy="0"/>
+        </a:xfrm>
+      </p:grpSpPr>
+      <p:sp>
+        <p:nvSpPr>
+          <p:cNvPr id="2" name="Title 1">
+            <a:extLst>
+              <a:ext uri="{FF2B5EF4-FFF2-40B4-BE49-F238E27FC236}">
+                <a16:creationId xmlns:a16="http://schemas.microsoft.com/office/drawing/2014/main" id="{5B1D4613-9FE4-76B1-4619-3CD2303A0A67}"/>
+              </a:ext>
+            </a:extLst>
+          </p:cNvPr>
+          <p:cNvSpPr>
+            <a:spLocks noGrp="1"/>
+          </p:cNvSpPr>
+          <p:nvPr>
+            <p:ph type="title"/>
+          </p:nvPr>
+        </p:nvSpPr>
+        <p:spPr/>
+        <p:txBody>
+          <a:bodyPr/>
+          <a:lstStyle/>
+          <a:p>
+            <a:r>
+              <a:rPr lang="cs-CZ" dirty="0"/>
+              <a:t>Podklady</a:t>
+            </a:r>
+          </a:p>
+        </p:txBody>
+      </p:sp>
+      <p:sp>
+        <p:nvSpPr>
+          <p:cNvPr id="3" name="Content Placeholder 2">
+            <a:extLst>
+              <a:ext uri="{FF2B5EF4-FFF2-40B4-BE49-F238E27FC236}">
+                <a16:creationId xmlns:a16="http://schemas.microsoft.com/office/drawing/2014/main" id="{9012BB58-91E0-349E-5FDB-0F33C2F24FA2}"/>
+              </a:ext>
+            </a:extLst>
+          </p:cNvPr>
+          <p:cNvSpPr>
+            <a:spLocks noGrp="1"/>
+          </p:cNvSpPr>
+          <p:nvPr>
+            <p:ph idx="1"/>
+          </p:nvPr>
+        </p:nvSpPr>
+        <p:spPr/>
+        <p:txBody>
+          <a:bodyPr/>
+          <a:lstStyle/>
+          <a:p>
+            <a:pPr marL="0" indent="0">
+              <a:buNone/>
+            </a:pPr>
+            <a:r>
+              <a:rPr lang="cs-CZ" dirty="0">
+                <a:hlinkClick r:id="rId2"/>
+              </a:rPr>
+              <a:t>https://github.com/jirikanda/BlazorDemos</a:t>
+            </a:r>
+            <a:endParaRPr lang="cs-CZ" dirty="0"/>
+          </a:p>
+          <a:p>
+            <a:pPr marL="0" indent="0">
+              <a:buNone/>
+            </a:pPr>
+            <a:br>
+              <a:rPr lang="cs-CZ" dirty="0"/>
+            </a:br>
+            <a:br>
+              <a:rPr lang="cs-CZ" dirty="0"/>
+            </a:br>
+            <a:br>
+              <a:rPr lang="cs-CZ" dirty="0"/>
+            </a:br>
+            <a:br>
+              <a:rPr lang="cs-CZ" dirty="0"/>
+            </a:br>
+            <a:br>
+              <a:rPr lang="cs-CZ" dirty="0"/>
+            </a:br>
+            <a:br>
+              <a:rPr lang="cs-CZ" dirty="0"/>
+            </a:br>
+            <a:endParaRPr lang="cs-CZ" dirty="0"/>
+          </a:p>
+          <a:p>
+            <a:pPr marL="0" indent="0">
+              <a:buNone/>
+            </a:pPr>
+            <a:r>
+              <a:rPr lang="cs-CZ" dirty="0"/>
+              <a:t>Prosím 🙏, neotevírejte podklady na zítřek.</a:t>
+            </a:r>
+          </a:p>
+          <a:p>
+            <a:pPr marL="0" indent="0">
+              <a:buNone/>
+            </a:pPr>
+            <a:endParaRPr lang="cs-CZ" dirty="0"/>
+          </a:p>
+        </p:txBody>
+      </p:sp>
+      <p:pic>
+        <p:nvPicPr>
+          <p:cNvPr id="5" name="Picture 4">
+            <a:extLst>
+              <a:ext uri="{FF2B5EF4-FFF2-40B4-BE49-F238E27FC236}">
+                <a16:creationId xmlns:a16="http://schemas.microsoft.com/office/drawing/2014/main" id="{DE58DD96-325F-08D7-01C1-ECE1C1E2872F}"/>
+              </a:ext>
+            </a:extLst>
+          </p:cNvPr>
+          <p:cNvPicPr>
+            <a:picLocks noChangeAspect="1"/>
+          </p:cNvPicPr>
+          <p:nvPr/>
+        </p:nvPicPr>
+        <p:blipFill>
+          <a:blip r:embed="rId3"/>
+          <a:stretch>
+            <a:fillRect/>
+          </a:stretch>
+        </p:blipFill>
+        <p:spPr>
+          <a:xfrm>
+            <a:off x="7248128" y="1916832"/>
+            <a:ext cx="4862314" cy="4862314"/>
+          </a:xfrm>
+          <a:prstGeom prst="rect">
+            <a:avLst/>
+          </a:prstGeom>
+        </p:spPr>
+      </p:pic>
+    </p:spTree>
+    <p:extLst>
+      <p:ext uri="{BB962C8B-B14F-4D97-AF65-F5344CB8AC3E}">
+        <p14:creationId xmlns:p14="http://schemas.microsoft.com/office/powerpoint/2010/main" val="3899707485"/>
       </p:ext>
     </p:extLst>
   </p:cSld>

</xml_diff>